<commit_message>
Archived Old Game, Updated Power Point
</commit_message>
<xml_diff>
--- a/Documentation/Dragons’ Reign - Rough Power Point.pptx
+++ b/Documentation/Dragons’ Reign - Rough Power Point.pptx
@@ -7,9 +7,24 @@
   <p:sldIdLst>
     <p:sldId id="256" r:id="rId2"/>
     <p:sldId id="260" r:id="rId3"/>
-    <p:sldId id="257" r:id="rId4"/>
-    <p:sldId id="258" r:id="rId5"/>
-    <p:sldId id="259" r:id="rId6"/>
+    <p:sldId id="272" r:id="rId4"/>
+    <p:sldId id="261" r:id="rId5"/>
+    <p:sldId id="257" r:id="rId6"/>
+    <p:sldId id="263" r:id="rId7"/>
+    <p:sldId id="264" r:id="rId8"/>
+    <p:sldId id="265" r:id="rId9"/>
+    <p:sldId id="266" r:id="rId10"/>
+    <p:sldId id="267" r:id="rId11"/>
+    <p:sldId id="268" r:id="rId12"/>
+    <p:sldId id="269" r:id="rId13"/>
+    <p:sldId id="270" r:id="rId14"/>
+    <p:sldId id="271" r:id="rId15"/>
+    <p:sldId id="258" r:id="rId16"/>
+    <p:sldId id="273" r:id="rId17"/>
+    <p:sldId id="274" r:id="rId18"/>
+    <p:sldId id="275" r:id="rId19"/>
+    <p:sldId id="262" r:id="rId20"/>
+    <p:sldId id="276" r:id="rId21"/>
   </p:sldIdLst>
   <p:sldSz cx="9144000" cy="6858000" type="screen4x3"/>
   <p:notesSz cx="6858000" cy="9144000"/>
@@ -495,7 +510,7 @@
           <a:p>
             <a:fld id="{1D643214-823C-4671-907A-63DC2A71500C}" type="datetimeFigureOut">
               <a:rPr lang="en-US" smtClean="0"/>
-              <a:t>7/15/2013</a:t>
+              <a:t>8/22/2013</a:t>
             </a:fld>
             <a:endParaRPr lang="en-US"/>
           </a:p>
@@ -660,7 +675,7 @@
           <a:p>
             <a:fld id="{1D643214-823C-4671-907A-63DC2A71500C}" type="datetimeFigureOut">
               <a:rPr lang="en-US" smtClean="0"/>
-              <a:t>7/15/2013</a:t>
+              <a:t>8/22/2013</a:t>
             </a:fld>
             <a:endParaRPr lang="en-US"/>
           </a:p>
@@ -835,7 +850,7 @@
           <a:p>
             <a:fld id="{1D643214-823C-4671-907A-63DC2A71500C}" type="datetimeFigureOut">
               <a:rPr lang="en-US" smtClean="0"/>
-              <a:t>7/15/2013</a:t>
+              <a:t>8/22/2013</a:t>
             </a:fld>
             <a:endParaRPr lang="en-US"/>
           </a:p>
@@ -1004,7 +1019,7 @@
           <a:p>
             <a:fld id="{1D643214-823C-4671-907A-63DC2A71500C}" type="datetimeFigureOut">
               <a:rPr lang="en-US" smtClean="0"/>
-              <a:t>7/15/2013</a:t>
+              <a:t>8/22/2013</a:t>
             </a:fld>
             <a:endParaRPr lang="en-US"/>
           </a:p>
@@ -1459,7 +1474,7 @@
           <a:p>
             <a:fld id="{1D643214-823C-4671-907A-63DC2A71500C}" type="datetimeFigureOut">
               <a:rPr lang="en-US" smtClean="0"/>
-              <a:t>7/15/2013</a:t>
+              <a:t>8/22/2013</a:t>
             </a:fld>
             <a:endParaRPr lang="en-US"/>
           </a:p>
@@ -1723,7 +1738,7 @@
           <a:p>
             <a:fld id="{1D643214-823C-4671-907A-63DC2A71500C}" type="datetimeFigureOut">
               <a:rPr lang="en-US" smtClean="0"/>
-              <a:t>7/15/2013</a:t>
+              <a:t>8/22/2013</a:t>
             </a:fld>
             <a:endParaRPr lang="en-US"/>
           </a:p>
@@ -2097,7 +2112,7 @@
           <a:p>
             <a:fld id="{1D643214-823C-4671-907A-63DC2A71500C}" type="datetimeFigureOut">
               <a:rPr lang="en-US" smtClean="0"/>
-              <a:t>7/15/2013</a:t>
+              <a:t>8/22/2013</a:t>
             </a:fld>
             <a:endParaRPr lang="en-US"/>
           </a:p>
@@ -2219,7 +2234,7 @@
           <a:p>
             <a:fld id="{1D643214-823C-4671-907A-63DC2A71500C}" type="datetimeFigureOut">
               <a:rPr lang="en-US" smtClean="0"/>
-              <a:t>7/15/2013</a:t>
+              <a:t>8/22/2013</a:t>
             </a:fld>
             <a:endParaRPr lang="en-US"/>
           </a:p>
@@ -2309,7 +2324,7 @@
           <a:p>
             <a:fld id="{1D643214-823C-4671-907A-63DC2A71500C}" type="datetimeFigureOut">
               <a:rPr lang="en-US" smtClean="0"/>
-              <a:t>7/15/2013</a:t>
+              <a:t>8/22/2013</a:t>
             </a:fld>
             <a:endParaRPr lang="en-US"/>
           </a:p>
@@ -2558,7 +2573,7 @@
           <a:p>
             <a:fld id="{1D643214-823C-4671-907A-63DC2A71500C}" type="datetimeFigureOut">
               <a:rPr lang="en-US" smtClean="0"/>
-              <a:t>7/15/2013</a:t>
+              <a:t>8/22/2013</a:t>
             </a:fld>
             <a:endParaRPr lang="en-US"/>
           </a:p>
@@ -2817,7 +2832,7 @@
           <a:p>
             <a:fld id="{1D643214-823C-4671-907A-63DC2A71500C}" type="datetimeFigureOut">
               <a:rPr lang="en-US" smtClean="0"/>
-              <a:t>7/15/2013</a:t>
+              <a:t>8/22/2013</a:t>
             </a:fld>
             <a:endParaRPr lang="en-US"/>
           </a:p>
@@ -3221,7 +3236,7 @@
           <a:p>
             <a:fld id="{1D643214-823C-4671-907A-63DC2A71500C}" type="datetimeFigureOut">
               <a:rPr lang="en-US" smtClean="0"/>
-              <a:t>7/15/2013</a:t>
+              <a:t>8/22/2013</a:t>
             </a:fld>
             <a:endParaRPr lang="en-US"/>
           </a:p>
@@ -3723,6 +3738,1294 @@
   <p:clrMapOvr>
     <a:masterClrMapping/>
   </p:clrMapOvr>
+  <p:timing>
+    <p:tnLst>
+      <p:par>
+        <p:cTn id="1" dur="indefinite" restart="never" nodeType="tmRoot"/>
+      </p:par>
+    </p:tnLst>
+  </p:timing>
+</p:sld>
+</file>
+
+<file path=ppt/slides/slide10.xml><?xml version="1.0" encoding="utf-8"?>
+<p:sld xmlns:a="http://schemas.openxmlformats.org/drawingml/2006/main" xmlns:r="http://schemas.openxmlformats.org/officeDocument/2006/relationships" xmlns:p="http://schemas.openxmlformats.org/presentationml/2006/main">
+  <p:cSld>
+    <p:spTree>
+      <p:nvGrpSpPr>
+        <p:cNvPr id="1" name=""/>
+        <p:cNvGrpSpPr/>
+        <p:nvPr/>
+      </p:nvGrpSpPr>
+      <p:grpSpPr>
+        <a:xfrm>
+          <a:off x="0" y="0"/>
+          <a:ext cx="0" cy="0"/>
+          <a:chOff x="0" y="0"/>
+          <a:chExt cx="0" cy="0"/>
+        </a:xfrm>
+      </p:grpSpPr>
+      <p:sp>
+        <p:nvSpPr>
+          <p:cNvPr id="2" name="Title 1"/>
+          <p:cNvSpPr>
+            <a:spLocks noGrp="1"/>
+          </p:cNvSpPr>
+          <p:nvPr>
+            <p:ph type="title"/>
+          </p:nvPr>
+        </p:nvSpPr>
+        <p:spPr/>
+        <p:txBody>
+          <a:bodyPr/>
+          <a:lstStyle/>
+          <a:p>
+            <a:r>
+              <a:rPr lang="en-US" dirty="0" smtClean="0"/>
+              <a:t>Cleric Abilities</a:t>
+            </a:r>
+            <a:endParaRPr lang="en-US" dirty="0"/>
+          </a:p>
+        </p:txBody>
+      </p:sp>
+      <p:sp>
+        <p:nvSpPr>
+          <p:cNvPr id="3" name="Content Placeholder 2"/>
+          <p:cNvSpPr>
+            <a:spLocks noGrp="1"/>
+          </p:cNvSpPr>
+          <p:nvPr>
+            <p:ph idx="1"/>
+          </p:nvPr>
+        </p:nvSpPr>
+        <p:spPr>
+          <a:xfrm>
+            <a:off x="457200" y="1600200"/>
+            <a:ext cx="7467600" cy="4953000"/>
+          </a:xfrm>
+        </p:spPr>
+        <p:txBody>
+          <a:bodyPr>
+            <a:normAutofit fontScale="47500" lnSpcReduction="20000"/>
+          </a:bodyPr>
+          <a:lstStyle/>
+          <a:p>
+            <a:r>
+              <a:rPr lang="en-US" sz="3300" dirty="0"/>
+              <a:t>Basic Attack</a:t>
+            </a:r>
+          </a:p>
+          <a:p>
+            <a:pPr lvl="1"/>
+            <a:r>
+              <a:rPr lang="en-US" sz="3300" dirty="0"/>
+              <a:t>No resource</a:t>
+            </a:r>
+          </a:p>
+          <a:p>
+            <a:r>
+              <a:rPr lang="en-US" sz="3300" dirty="0"/>
+              <a:t>Heal/Life Syphon</a:t>
+            </a:r>
+          </a:p>
+          <a:p>
+            <a:pPr lvl="1"/>
+            <a:r>
+              <a:rPr lang="en-US" sz="3300" dirty="0"/>
+              <a:t>On party pick</a:t>
+            </a:r>
+          </a:p>
+          <a:p>
+            <a:pPr lvl="2"/>
+            <a:r>
+              <a:rPr lang="en-US" sz="3300" dirty="0"/>
+              <a:t>Heals 1 party member</a:t>
+            </a:r>
+          </a:p>
+          <a:p>
+            <a:pPr lvl="1"/>
+            <a:r>
+              <a:rPr lang="en-US" sz="3300" dirty="0"/>
+              <a:t>On enemy pick</a:t>
+            </a:r>
+          </a:p>
+          <a:p>
+            <a:pPr lvl="2"/>
+            <a:r>
+              <a:rPr lang="en-US" sz="3300" dirty="0"/>
+              <a:t>Deals base damage</a:t>
+            </a:r>
+          </a:p>
+          <a:p>
+            <a:pPr lvl="2"/>
+            <a:r>
+              <a:rPr lang="en-US" sz="3300" dirty="0"/>
+              <a:t>Half damage dealt converted to health</a:t>
+            </a:r>
+          </a:p>
+          <a:p>
+            <a:r>
+              <a:rPr lang="en-US" sz="3300" dirty="0"/>
+              <a:t>Revive</a:t>
+            </a:r>
+          </a:p>
+          <a:p>
+            <a:pPr lvl="1"/>
+            <a:r>
+              <a:rPr lang="en-US" sz="3300" dirty="0"/>
+              <a:t>Resurrects a fallen party member</a:t>
+            </a:r>
+          </a:p>
+          <a:p>
+            <a:r>
+              <a:rPr lang="en-US" sz="3300" dirty="0"/>
+              <a:t>Healing Chant</a:t>
+            </a:r>
+          </a:p>
+          <a:p>
+            <a:pPr lvl="1"/>
+            <a:r>
+              <a:rPr lang="en-US" sz="3300" dirty="0"/>
+              <a:t>Charges for 1 turn</a:t>
+            </a:r>
+          </a:p>
+          <a:p>
+            <a:pPr lvl="1"/>
+            <a:r>
+              <a:rPr lang="en-US" sz="3300" dirty="0"/>
+              <a:t>Heals entire party</a:t>
+            </a:r>
+          </a:p>
+          <a:p>
+            <a:pPr lvl="1"/>
+            <a:r>
+              <a:rPr lang="en-US" sz="3300" dirty="0"/>
+              <a:t>Costs substantial </a:t>
+            </a:r>
+            <a:r>
+              <a:rPr lang="en-US" sz="3300" dirty="0" err="1"/>
+              <a:t>mana</a:t>
+            </a:r>
+            <a:endParaRPr lang="en-US" sz="3300" dirty="0"/>
+          </a:p>
+          <a:p>
+            <a:r>
+              <a:rPr lang="en-US" sz="3300" dirty="0"/>
+              <a:t>Empower</a:t>
+            </a:r>
+          </a:p>
+          <a:p>
+            <a:pPr lvl="1"/>
+            <a:r>
+              <a:rPr lang="en-US" sz="3300" dirty="0"/>
+              <a:t>Boost to all primary stats to party</a:t>
+            </a:r>
+          </a:p>
+          <a:p>
+            <a:pPr lvl="1"/>
+            <a:r>
+              <a:rPr lang="en-US" sz="3300" dirty="0"/>
+              <a:t>Costs substantial </a:t>
+            </a:r>
+            <a:r>
+              <a:rPr lang="en-US" sz="3300" dirty="0" err="1"/>
+              <a:t>mana</a:t>
+            </a:r>
+            <a:endParaRPr lang="en-US" sz="3300" dirty="0"/>
+          </a:p>
+          <a:p>
+            <a:r>
+              <a:rPr lang="en-US" sz="3300" dirty="0"/>
+              <a:t>Mend</a:t>
+            </a:r>
+          </a:p>
+          <a:p>
+            <a:pPr lvl="1"/>
+            <a:r>
+              <a:rPr lang="en-US" sz="3300" dirty="0"/>
+              <a:t>Heal over </a:t>
+            </a:r>
+            <a:r>
+              <a:rPr lang="en-US" sz="3300" dirty="0" smtClean="0"/>
+              <a:t>time</a:t>
+            </a:r>
+          </a:p>
+          <a:p>
+            <a:endParaRPr lang="en-US" dirty="0"/>
+          </a:p>
+        </p:txBody>
+      </p:sp>
+    </p:spTree>
+    <p:extLst>
+      <p:ext uri="{BB962C8B-B14F-4D97-AF65-F5344CB8AC3E}">
+        <p14:creationId xmlns:p14="http://schemas.microsoft.com/office/powerpoint/2010/main" val="1965642191"/>
+      </p:ext>
+    </p:extLst>
+  </p:cSld>
+  <p:clrMapOvr>
+    <a:masterClrMapping/>
+  </p:clrMapOvr>
+  <p:timing>
+    <p:tnLst>
+      <p:par>
+        <p:cTn id="1" dur="indefinite" restart="never" nodeType="tmRoot"/>
+      </p:par>
+    </p:tnLst>
+  </p:timing>
+</p:sld>
+</file>
+
+<file path=ppt/slides/slide11.xml><?xml version="1.0" encoding="utf-8"?>
+<p:sld xmlns:a="http://schemas.openxmlformats.org/drawingml/2006/main" xmlns:r="http://schemas.openxmlformats.org/officeDocument/2006/relationships" xmlns:p="http://schemas.openxmlformats.org/presentationml/2006/main">
+  <p:cSld>
+    <p:spTree>
+      <p:nvGrpSpPr>
+        <p:cNvPr id="1" name=""/>
+        <p:cNvGrpSpPr/>
+        <p:nvPr/>
+      </p:nvGrpSpPr>
+      <p:grpSpPr>
+        <a:xfrm>
+          <a:off x="0" y="0"/>
+          <a:ext cx="0" cy="0"/>
+          <a:chOff x="0" y="0"/>
+          <a:chExt cx="0" cy="0"/>
+        </a:xfrm>
+      </p:grpSpPr>
+      <p:sp>
+        <p:nvSpPr>
+          <p:cNvPr id="2" name="Title 1"/>
+          <p:cNvSpPr>
+            <a:spLocks noGrp="1"/>
+          </p:cNvSpPr>
+          <p:nvPr>
+            <p:ph type="title"/>
+          </p:nvPr>
+        </p:nvSpPr>
+        <p:spPr/>
+        <p:txBody>
+          <a:bodyPr/>
+          <a:lstStyle/>
+          <a:p>
+            <a:r>
+              <a:rPr lang="en-US" dirty="0" smtClean="0"/>
+              <a:t>Cleric Gear</a:t>
+            </a:r>
+            <a:endParaRPr lang="en-US" dirty="0"/>
+          </a:p>
+        </p:txBody>
+      </p:sp>
+      <p:sp>
+        <p:nvSpPr>
+          <p:cNvPr id="3" name="Content Placeholder 2"/>
+          <p:cNvSpPr>
+            <a:spLocks noGrp="1"/>
+          </p:cNvSpPr>
+          <p:nvPr>
+            <p:ph idx="1"/>
+          </p:nvPr>
+        </p:nvSpPr>
+        <p:spPr/>
+        <p:txBody>
+          <a:bodyPr>
+            <a:normAutofit/>
+          </a:bodyPr>
+          <a:lstStyle/>
+          <a:p>
+            <a:r>
+              <a:rPr lang="en-US" dirty="0" smtClean="0"/>
+              <a:t>Armor</a:t>
+            </a:r>
+          </a:p>
+          <a:p>
+            <a:pPr lvl="1"/>
+            <a:r>
+              <a:rPr lang="en-US" dirty="0" smtClean="0"/>
+              <a:t>Light</a:t>
+            </a:r>
+          </a:p>
+          <a:p>
+            <a:r>
+              <a:rPr lang="en-US" dirty="0" smtClean="0"/>
+              <a:t>Weapons</a:t>
+            </a:r>
+          </a:p>
+          <a:p>
+            <a:pPr lvl="1"/>
+            <a:r>
+              <a:rPr lang="en-US" dirty="0"/>
+              <a:t>Wands</a:t>
+            </a:r>
+          </a:p>
+          <a:p>
+            <a:pPr lvl="1"/>
+            <a:r>
+              <a:rPr lang="en-US" dirty="0"/>
+              <a:t>Orbs</a:t>
+            </a:r>
+          </a:p>
+          <a:p>
+            <a:pPr lvl="1"/>
+            <a:r>
+              <a:rPr lang="en-US" dirty="0"/>
+              <a:t>Staves</a:t>
+            </a:r>
+          </a:p>
+          <a:p>
+            <a:endParaRPr lang="en-US" dirty="0" smtClean="0"/>
+          </a:p>
+          <a:p>
+            <a:pPr lvl="1"/>
+            <a:endParaRPr lang="en-US" dirty="0"/>
+          </a:p>
+          <a:p>
+            <a:pPr lvl="1"/>
+            <a:endParaRPr lang="en-US" dirty="0"/>
+          </a:p>
+        </p:txBody>
+      </p:sp>
+    </p:spTree>
+    <p:extLst>
+      <p:ext uri="{BB962C8B-B14F-4D97-AF65-F5344CB8AC3E}">
+        <p14:creationId xmlns:p14="http://schemas.microsoft.com/office/powerpoint/2010/main" val="1918641379"/>
+      </p:ext>
+    </p:extLst>
+  </p:cSld>
+  <p:clrMapOvr>
+    <a:masterClrMapping/>
+  </p:clrMapOvr>
+  <p:timing>
+    <p:tnLst>
+      <p:par>
+        <p:cTn id="1" dur="indefinite" restart="never" nodeType="tmRoot"/>
+      </p:par>
+    </p:tnLst>
+  </p:timing>
+</p:sld>
+</file>
+
+<file path=ppt/slides/slide12.xml><?xml version="1.0" encoding="utf-8"?>
+<p:sld xmlns:a="http://schemas.openxmlformats.org/drawingml/2006/main" xmlns:r="http://schemas.openxmlformats.org/officeDocument/2006/relationships" xmlns:p="http://schemas.openxmlformats.org/presentationml/2006/main">
+  <p:cSld>
+    <p:spTree>
+      <p:nvGrpSpPr>
+        <p:cNvPr id="1" name=""/>
+        <p:cNvGrpSpPr/>
+        <p:nvPr/>
+      </p:nvGrpSpPr>
+      <p:grpSpPr>
+        <a:xfrm>
+          <a:off x="0" y="0"/>
+          <a:ext cx="0" cy="0"/>
+          <a:chOff x="0" y="0"/>
+          <a:chExt cx="0" cy="0"/>
+        </a:xfrm>
+      </p:grpSpPr>
+      <p:sp>
+        <p:nvSpPr>
+          <p:cNvPr id="2" name="Title 1"/>
+          <p:cNvSpPr>
+            <a:spLocks noGrp="1"/>
+          </p:cNvSpPr>
+          <p:nvPr>
+            <p:ph type="title"/>
+          </p:nvPr>
+        </p:nvSpPr>
+        <p:spPr/>
+        <p:txBody>
+          <a:bodyPr/>
+          <a:lstStyle/>
+          <a:p>
+            <a:r>
+              <a:rPr lang="en-US" dirty="0" smtClean="0"/>
+              <a:t>Ranger Description</a:t>
+            </a:r>
+            <a:endParaRPr lang="en-US" dirty="0"/>
+          </a:p>
+        </p:txBody>
+      </p:sp>
+      <p:sp>
+        <p:nvSpPr>
+          <p:cNvPr id="3" name="Content Placeholder 2"/>
+          <p:cNvSpPr>
+            <a:spLocks noGrp="1"/>
+          </p:cNvSpPr>
+          <p:nvPr>
+            <p:ph idx="1"/>
+          </p:nvPr>
+        </p:nvSpPr>
+        <p:spPr/>
+        <p:txBody>
+          <a:bodyPr/>
+          <a:lstStyle/>
+          <a:p>
+            <a:endParaRPr lang="en-US" dirty="0" smtClean="0"/>
+          </a:p>
+          <a:p>
+            <a:r>
+              <a:rPr lang="en-US" sz="3200" dirty="0"/>
+              <a:t>Master of ranged attacks, capable of killing with pinpoint precision from afar. Prefers stealing from the rich and giving to the poor.</a:t>
+            </a:r>
+            <a:endParaRPr lang="en-US" sz="2800" dirty="0"/>
+          </a:p>
+        </p:txBody>
+      </p:sp>
+    </p:spTree>
+    <p:extLst>
+      <p:ext uri="{BB962C8B-B14F-4D97-AF65-F5344CB8AC3E}">
+        <p14:creationId xmlns:p14="http://schemas.microsoft.com/office/powerpoint/2010/main" val="825001137"/>
+      </p:ext>
+    </p:extLst>
+  </p:cSld>
+  <p:clrMapOvr>
+    <a:masterClrMapping/>
+  </p:clrMapOvr>
+  <p:timing>
+    <p:tnLst>
+      <p:par>
+        <p:cTn id="1" dur="indefinite" restart="never" nodeType="tmRoot"/>
+      </p:par>
+    </p:tnLst>
+  </p:timing>
+</p:sld>
+</file>
+
+<file path=ppt/slides/slide13.xml><?xml version="1.0" encoding="utf-8"?>
+<p:sld xmlns:a="http://schemas.openxmlformats.org/drawingml/2006/main" xmlns:r="http://schemas.openxmlformats.org/officeDocument/2006/relationships" xmlns:p="http://schemas.openxmlformats.org/presentationml/2006/main">
+  <p:cSld>
+    <p:spTree>
+      <p:nvGrpSpPr>
+        <p:cNvPr id="1" name=""/>
+        <p:cNvGrpSpPr/>
+        <p:nvPr/>
+      </p:nvGrpSpPr>
+      <p:grpSpPr>
+        <a:xfrm>
+          <a:off x="0" y="0"/>
+          <a:ext cx="0" cy="0"/>
+          <a:chOff x="0" y="0"/>
+          <a:chExt cx="0" cy="0"/>
+        </a:xfrm>
+      </p:grpSpPr>
+      <p:sp>
+        <p:nvSpPr>
+          <p:cNvPr id="2" name="Title 1"/>
+          <p:cNvSpPr>
+            <a:spLocks noGrp="1"/>
+          </p:cNvSpPr>
+          <p:nvPr>
+            <p:ph type="title"/>
+          </p:nvPr>
+        </p:nvSpPr>
+        <p:spPr/>
+        <p:txBody>
+          <a:bodyPr/>
+          <a:lstStyle/>
+          <a:p>
+            <a:r>
+              <a:rPr lang="en-US" dirty="0" smtClean="0"/>
+              <a:t>Ranger Abilities</a:t>
+            </a:r>
+            <a:endParaRPr lang="en-US" dirty="0"/>
+          </a:p>
+        </p:txBody>
+      </p:sp>
+      <p:sp>
+        <p:nvSpPr>
+          <p:cNvPr id="3" name="Content Placeholder 2"/>
+          <p:cNvSpPr>
+            <a:spLocks noGrp="1"/>
+          </p:cNvSpPr>
+          <p:nvPr>
+            <p:ph idx="1"/>
+          </p:nvPr>
+        </p:nvSpPr>
+        <p:spPr/>
+        <p:txBody>
+          <a:bodyPr>
+            <a:normAutofit fontScale="62500" lnSpcReduction="20000"/>
+          </a:bodyPr>
+          <a:lstStyle/>
+          <a:p>
+            <a:r>
+              <a:rPr lang="en-US" dirty="0"/>
+              <a:t>Basic Attack</a:t>
+            </a:r>
+          </a:p>
+          <a:p>
+            <a:pPr lvl="1"/>
+            <a:r>
+              <a:rPr lang="en-US" dirty="0"/>
+              <a:t>No resource</a:t>
+            </a:r>
+          </a:p>
+          <a:p>
+            <a:r>
+              <a:rPr lang="en-US" dirty="0"/>
+              <a:t>Fire Arrow</a:t>
+            </a:r>
+          </a:p>
+          <a:p>
+            <a:pPr lvl="1"/>
+            <a:r>
+              <a:rPr lang="en-US" dirty="0"/>
+              <a:t>Less base damage</a:t>
+            </a:r>
+          </a:p>
+          <a:p>
+            <a:pPr lvl="1"/>
+            <a:r>
+              <a:rPr lang="en-US" dirty="0"/>
+              <a:t>Chance to burn</a:t>
+            </a:r>
+          </a:p>
+          <a:p>
+            <a:r>
+              <a:rPr lang="en-US" dirty="0"/>
+              <a:t>Poison Arrow</a:t>
+            </a:r>
+          </a:p>
+          <a:p>
+            <a:pPr lvl="1"/>
+            <a:r>
+              <a:rPr lang="en-US" dirty="0"/>
+              <a:t>Less base damage</a:t>
+            </a:r>
+          </a:p>
+          <a:p>
+            <a:pPr lvl="1"/>
+            <a:r>
+              <a:rPr lang="en-US" dirty="0"/>
+              <a:t>Chance to poison</a:t>
+            </a:r>
+          </a:p>
+          <a:p>
+            <a:r>
+              <a:rPr lang="en-US" dirty="0"/>
+              <a:t>Spread Shot</a:t>
+            </a:r>
+          </a:p>
+          <a:p>
+            <a:pPr lvl="1"/>
+            <a:r>
+              <a:rPr lang="en-US" dirty="0"/>
+              <a:t>Attacks all enemies</a:t>
+            </a:r>
+          </a:p>
+          <a:p>
+            <a:pPr lvl="1"/>
+            <a:r>
+              <a:rPr lang="en-US" dirty="0"/>
+              <a:t>75% base damage</a:t>
+            </a:r>
+          </a:p>
+          <a:p>
+            <a:r>
+              <a:rPr lang="en-US" dirty="0"/>
+              <a:t>Charged Shot</a:t>
+            </a:r>
+          </a:p>
+          <a:p>
+            <a:pPr lvl="1"/>
+            <a:r>
+              <a:rPr lang="en-US" dirty="0"/>
+              <a:t>Charges for one turn</a:t>
+            </a:r>
+          </a:p>
+          <a:p>
+            <a:pPr lvl="1"/>
+            <a:r>
+              <a:rPr lang="en-US" dirty="0"/>
+              <a:t>Chance to deal 2x-5x damage</a:t>
+            </a:r>
+          </a:p>
+          <a:p>
+            <a:r>
+              <a:rPr lang="en-US" dirty="0"/>
+              <a:t>Stun Arrow</a:t>
+            </a:r>
+          </a:p>
+          <a:p>
+            <a:pPr lvl="1"/>
+            <a:r>
+              <a:rPr lang="en-US" dirty="0"/>
+              <a:t>No initial damage</a:t>
+            </a:r>
+          </a:p>
+          <a:p>
+            <a:pPr lvl="1"/>
+            <a:r>
+              <a:rPr lang="en-US" dirty="0"/>
+              <a:t>Chance to stun</a:t>
+            </a:r>
+          </a:p>
+          <a:p>
+            <a:endParaRPr lang="en-US" dirty="0"/>
+          </a:p>
+        </p:txBody>
+      </p:sp>
+    </p:spTree>
+    <p:extLst>
+      <p:ext uri="{BB962C8B-B14F-4D97-AF65-F5344CB8AC3E}">
+        <p14:creationId xmlns:p14="http://schemas.microsoft.com/office/powerpoint/2010/main" val="642397049"/>
+      </p:ext>
+    </p:extLst>
+  </p:cSld>
+  <p:clrMapOvr>
+    <a:masterClrMapping/>
+  </p:clrMapOvr>
+  <p:timing>
+    <p:tnLst>
+      <p:par>
+        <p:cTn id="1" dur="indefinite" restart="never" nodeType="tmRoot"/>
+      </p:par>
+    </p:tnLst>
+  </p:timing>
+</p:sld>
+</file>
+
+<file path=ppt/slides/slide14.xml><?xml version="1.0" encoding="utf-8"?>
+<p:sld xmlns:a="http://schemas.openxmlformats.org/drawingml/2006/main" xmlns:r="http://schemas.openxmlformats.org/officeDocument/2006/relationships" xmlns:p="http://schemas.openxmlformats.org/presentationml/2006/main">
+  <p:cSld>
+    <p:spTree>
+      <p:nvGrpSpPr>
+        <p:cNvPr id="1" name=""/>
+        <p:cNvGrpSpPr/>
+        <p:nvPr/>
+      </p:nvGrpSpPr>
+      <p:grpSpPr>
+        <a:xfrm>
+          <a:off x="0" y="0"/>
+          <a:ext cx="0" cy="0"/>
+          <a:chOff x="0" y="0"/>
+          <a:chExt cx="0" cy="0"/>
+        </a:xfrm>
+      </p:grpSpPr>
+      <p:sp>
+        <p:nvSpPr>
+          <p:cNvPr id="2" name="Title 1"/>
+          <p:cNvSpPr>
+            <a:spLocks noGrp="1"/>
+          </p:cNvSpPr>
+          <p:nvPr>
+            <p:ph type="title"/>
+          </p:nvPr>
+        </p:nvSpPr>
+        <p:spPr/>
+        <p:txBody>
+          <a:bodyPr/>
+          <a:lstStyle/>
+          <a:p>
+            <a:r>
+              <a:rPr lang="en-US" dirty="0" smtClean="0"/>
+              <a:t>Ranger Gear</a:t>
+            </a:r>
+            <a:endParaRPr lang="en-US" dirty="0"/>
+          </a:p>
+        </p:txBody>
+      </p:sp>
+      <p:sp>
+        <p:nvSpPr>
+          <p:cNvPr id="3" name="Content Placeholder 2"/>
+          <p:cNvSpPr>
+            <a:spLocks noGrp="1"/>
+          </p:cNvSpPr>
+          <p:nvPr>
+            <p:ph idx="1"/>
+          </p:nvPr>
+        </p:nvSpPr>
+        <p:spPr/>
+        <p:txBody>
+          <a:bodyPr>
+            <a:normAutofit/>
+          </a:bodyPr>
+          <a:lstStyle/>
+          <a:p>
+            <a:r>
+              <a:rPr lang="en-US" dirty="0" smtClean="0"/>
+              <a:t>Armor</a:t>
+            </a:r>
+          </a:p>
+          <a:p>
+            <a:pPr lvl="1"/>
+            <a:r>
+              <a:rPr lang="en-US" dirty="0" smtClean="0"/>
+              <a:t>Medium</a:t>
+            </a:r>
+          </a:p>
+          <a:p>
+            <a:r>
+              <a:rPr lang="en-US" dirty="0" smtClean="0"/>
+              <a:t>Weapons</a:t>
+            </a:r>
+          </a:p>
+          <a:p>
+            <a:pPr lvl="1"/>
+            <a:r>
+              <a:rPr lang="en-US" dirty="0"/>
+              <a:t>Longbows</a:t>
+            </a:r>
+          </a:p>
+          <a:p>
+            <a:pPr lvl="2"/>
+            <a:r>
+              <a:rPr lang="en-US" dirty="0"/>
+              <a:t>Arrows</a:t>
+            </a:r>
+            <a:endParaRPr lang="en-US" sz="2200" dirty="0"/>
+          </a:p>
+          <a:p>
+            <a:pPr lvl="1"/>
+            <a:r>
+              <a:rPr lang="en-US" dirty="0" smtClean="0"/>
+              <a:t>Short bows</a:t>
+            </a:r>
+            <a:endParaRPr lang="en-US" dirty="0"/>
+          </a:p>
+          <a:p>
+            <a:pPr lvl="2"/>
+            <a:r>
+              <a:rPr lang="en-US" dirty="0"/>
+              <a:t>Arrows</a:t>
+            </a:r>
+            <a:endParaRPr lang="en-US" sz="2200" dirty="0"/>
+          </a:p>
+          <a:p>
+            <a:pPr lvl="1"/>
+            <a:r>
+              <a:rPr lang="en-US" dirty="0"/>
+              <a:t>Crossbows</a:t>
+            </a:r>
+          </a:p>
+          <a:p>
+            <a:pPr lvl="2"/>
+            <a:r>
+              <a:rPr lang="en-US" dirty="0"/>
+              <a:t>Bolts</a:t>
+            </a:r>
+            <a:endParaRPr lang="en-US" sz="2200" dirty="0"/>
+          </a:p>
+          <a:p>
+            <a:endParaRPr lang="en-US" dirty="0" smtClean="0"/>
+          </a:p>
+          <a:p>
+            <a:pPr lvl="1"/>
+            <a:endParaRPr lang="en-US" dirty="0"/>
+          </a:p>
+          <a:p>
+            <a:pPr lvl="1"/>
+            <a:endParaRPr lang="en-US" dirty="0"/>
+          </a:p>
+        </p:txBody>
+      </p:sp>
+    </p:spTree>
+    <p:extLst>
+      <p:ext uri="{BB962C8B-B14F-4D97-AF65-F5344CB8AC3E}">
+        <p14:creationId xmlns:p14="http://schemas.microsoft.com/office/powerpoint/2010/main" val="1209259162"/>
+      </p:ext>
+    </p:extLst>
+  </p:cSld>
+  <p:clrMapOvr>
+    <a:masterClrMapping/>
+  </p:clrMapOvr>
+  <p:timing>
+    <p:tnLst>
+      <p:par>
+        <p:cTn id="1" dur="indefinite" restart="never" nodeType="tmRoot"/>
+      </p:par>
+    </p:tnLst>
+  </p:timing>
+</p:sld>
+</file>
+
+<file path=ppt/slides/slide15.xml><?xml version="1.0" encoding="utf-8"?>
+<p:sld xmlns:a="http://schemas.openxmlformats.org/drawingml/2006/main" xmlns:r="http://schemas.openxmlformats.org/officeDocument/2006/relationships" xmlns:p="http://schemas.openxmlformats.org/presentationml/2006/main">
+  <p:cSld>
+    <p:spTree>
+      <p:nvGrpSpPr>
+        <p:cNvPr id="1" name=""/>
+        <p:cNvGrpSpPr/>
+        <p:nvPr/>
+      </p:nvGrpSpPr>
+      <p:grpSpPr>
+        <a:xfrm>
+          <a:off x="0" y="0"/>
+          <a:ext cx="0" cy="0"/>
+          <a:chOff x="0" y="0"/>
+          <a:chExt cx="0" cy="0"/>
+        </a:xfrm>
+      </p:grpSpPr>
+      <p:sp>
+        <p:nvSpPr>
+          <p:cNvPr id="2" name="Title 1"/>
+          <p:cNvSpPr>
+            <a:spLocks noGrp="1"/>
+          </p:cNvSpPr>
+          <p:nvPr>
+            <p:ph type="title"/>
+          </p:nvPr>
+        </p:nvSpPr>
+        <p:spPr/>
+        <p:txBody>
+          <a:bodyPr/>
+          <a:lstStyle/>
+          <a:p>
+            <a:r>
+              <a:rPr lang="en-US" dirty="0" smtClean="0"/>
+              <a:t>Zones</a:t>
+            </a:r>
+            <a:endParaRPr lang="en-US" dirty="0"/>
+          </a:p>
+        </p:txBody>
+      </p:sp>
+      <p:sp>
+        <p:nvSpPr>
+          <p:cNvPr id="3" name="Content Placeholder 2"/>
+          <p:cNvSpPr>
+            <a:spLocks noGrp="1"/>
+          </p:cNvSpPr>
+          <p:nvPr>
+            <p:ph idx="1"/>
+          </p:nvPr>
+        </p:nvSpPr>
+        <p:spPr/>
+        <p:txBody>
+          <a:bodyPr>
+            <a:normAutofit/>
+          </a:bodyPr>
+          <a:lstStyle/>
+          <a:p>
+            <a:r>
+              <a:rPr lang="en-US" dirty="0" smtClean="0"/>
+              <a:t>Starter </a:t>
+            </a:r>
+            <a:r>
+              <a:rPr lang="en-US" dirty="0" smtClean="0"/>
+              <a:t>Village</a:t>
+            </a:r>
+          </a:p>
+          <a:p>
+            <a:r>
+              <a:rPr lang="en-US" dirty="0" smtClean="0"/>
+              <a:t>Plains</a:t>
+            </a:r>
+            <a:endParaRPr lang="en-US" dirty="0" smtClean="0"/>
+          </a:p>
+          <a:p>
+            <a:r>
+              <a:rPr lang="en-US" dirty="0" smtClean="0"/>
+              <a:t>Mountains</a:t>
+            </a:r>
+            <a:endParaRPr lang="en-US" dirty="0" smtClean="0"/>
+          </a:p>
+        </p:txBody>
+      </p:sp>
+    </p:spTree>
+    <p:extLst>
+      <p:ext uri="{BB962C8B-B14F-4D97-AF65-F5344CB8AC3E}">
+        <p14:creationId xmlns:p14="http://schemas.microsoft.com/office/powerpoint/2010/main" val="457825509"/>
+      </p:ext>
+    </p:extLst>
+  </p:cSld>
+  <p:clrMapOvr>
+    <a:masterClrMapping/>
+  </p:clrMapOvr>
+  <p:timing>
+    <p:tnLst>
+      <p:par>
+        <p:cTn id="1" dur="indefinite" restart="never" nodeType="tmRoot"/>
+      </p:par>
+    </p:tnLst>
+  </p:timing>
+</p:sld>
+</file>
+
+<file path=ppt/slides/slide16.xml><?xml version="1.0" encoding="utf-8"?>
+<p:sld xmlns:a="http://schemas.openxmlformats.org/drawingml/2006/main" xmlns:r="http://schemas.openxmlformats.org/officeDocument/2006/relationships" xmlns:p="http://schemas.openxmlformats.org/presentationml/2006/main">
+  <p:cSld>
+    <p:spTree>
+      <p:nvGrpSpPr>
+        <p:cNvPr id="1" name=""/>
+        <p:cNvGrpSpPr/>
+        <p:nvPr/>
+      </p:nvGrpSpPr>
+      <p:grpSpPr>
+        <a:xfrm>
+          <a:off x="0" y="0"/>
+          <a:ext cx="0" cy="0"/>
+          <a:chOff x="0" y="0"/>
+          <a:chExt cx="0" cy="0"/>
+        </a:xfrm>
+      </p:grpSpPr>
+      <p:sp>
+        <p:nvSpPr>
+          <p:cNvPr id="2" name="Title 1"/>
+          <p:cNvSpPr>
+            <a:spLocks noGrp="1"/>
+          </p:cNvSpPr>
+          <p:nvPr>
+            <p:ph type="title"/>
+          </p:nvPr>
+        </p:nvSpPr>
+        <p:spPr/>
+        <p:txBody>
+          <a:bodyPr/>
+          <a:lstStyle/>
+          <a:p>
+            <a:r>
+              <a:rPr lang="en-US" dirty="0" smtClean="0"/>
+              <a:t>Starter Village</a:t>
+            </a:r>
+            <a:endParaRPr lang="en-US" dirty="0"/>
+          </a:p>
+        </p:txBody>
+      </p:sp>
+      <p:sp>
+        <p:nvSpPr>
+          <p:cNvPr id="3" name="Content Placeholder 2"/>
+          <p:cNvSpPr>
+            <a:spLocks noGrp="1"/>
+          </p:cNvSpPr>
+          <p:nvPr>
+            <p:ph idx="1"/>
+          </p:nvPr>
+        </p:nvSpPr>
+        <p:spPr/>
+        <p:txBody>
+          <a:bodyPr/>
+          <a:lstStyle/>
+          <a:p>
+            <a:endParaRPr lang="en-US"/>
+          </a:p>
+        </p:txBody>
+      </p:sp>
+    </p:spTree>
+    <p:extLst>
+      <p:ext uri="{BB962C8B-B14F-4D97-AF65-F5344CB8AC3E}">
+        <p14:creationId xmlns:p14="http://schemas.microsoft.com/office/powerpoint/2010/main" val="1476739742"/>
+      </p:ext>
+    </p:extLst>
+  </p:cSld>
+  <p:clrMapOvr>
+    <a:masterClrMapping/>
+  </p:clrMapOvr>
+  <p:timing>
+    <p:tnLst>
+      <p:par>
+        <p:cTn id="1" dur="indefinite" restart="never" nodeType="tmRoot"/>
+      </p:par>
+    </p:tnLst>
+  </p:timing>
+</p:sld>
+</file>
+
+<file path=ppt/slides/slide17.xml><?xml version="1.0" encoding="utf-8"?>
+<p:sld xmlns:a="http://schemas.openxmlformats.org/drawingml/2006/main" xmlns:r="http://schemas.openxmlformats.org/officeDocument/2006/relationships" xmlns:p="http://schemas.openxmlformats.org/presentationml/2006/main">
+  <p:cSld>
+    <p:spTree>
+      <p:nvGrpSpPr>
+        <p:cNvPr id="1" name=""/>
+        <p:cNvGrpSpPr/>
+        <p:nvPr/>
+      </p:nvGrpSpPr>
+      <p:grpSpPr>
+        <a:xfrm>
+          <a:off x="0" y="0"/>
+          <a:ext cx="0" cy="0"/>
+          <a:chOff x="0" y="0"/>
+          <a:chExt cx="0" cy="0"/>
+        </a:xfrm>
+      </p:grpSpPr>
+      <p:sp>
+        <p:nvSpPr>
+          <p:cNvPr id="2" name="Title 1"/>
+          <p:cNvSpPr>
+            <a:spLocks noGrp="1"/>
+          </p:cNvSpPr>
+          <p:nvPr>
+            <p:ph type="title"/>
+          </p:nvPr>
+        </p:nvSpPr>
+        <p:spPr/>
+        <p:txBody>
+          <a:bodyPr/>
+          <a:lstStyle/>
+          <a:p>
+            <a:r>
+              <a:rPr lang="en-US" dirty="0" smtClean="0"/>
+              <a:t>Plains</a:t>
+            </a:r>
+            <a:endParaRPr lang="en-US" dirty="0"/>
+          </a:p>
+        </p:txBody>
+      </p:sp>
+      <p:sp>
+        <p:nvSpPr>
+          <p:cNvPr id="3" name="Content Placeholder 2"/>
+          <p:cNvSpPr>
+            <a:spLocks noGrp="1"/>
+          </p:cNvSpPr>
+          <p:nvPr>
+            <p:ph idx="1"/>
+          </p:nvPr>
+        </p:nvSpPr>
+        <p:spPr/>
+        <p:txBody>
+          <a:bodyPr/>
+          <a:lstStyle/>
+          <a:p>
+            <a:endParaRPr lang="en-US"/>
+          </a:p>
+        </p:txBody>
+      </p:sp>
+    </p:spTree>
+    <p:extLst>
+      <p:ext uri="{BB962C8B-B14F-4D97-AF65-F5344CB8AC3E}">
+        <p14:creationId xmlns:p14="http://schemas.microsoft.com/office/powerpoint/2010/main" val="338198410"/>
+      </p:ext>
+    </p:extLst>
+  </p:cSld>
+  <p:clrMapOvr>
+    <a:masterClrMapping/>
+  </p:clrMapOvr>
+  <p:timing>
+    <p:tnLst>
+      <p:par>
+        <p:cTn id="1" dur="indefinite" restart="never" nodeType="tmRoot"/>
+      </p:par>
+    </p:tnLst>
+  </p:timing>
+</p:sld>
+</file>
+
+<file path=ppt/slides/slide18.xml><?xml version="1.0" encoding="utf-8"?>
+<p:sld xmlns:a="http://schemas.openxmlformats.org/drawingml/2006/main" xmlns:r="http://schemas.openxmlformats.org/officeDocument/2006/relationships" xmlns:p="http://schemas.openxmlformats.org/presentationml/2006/main">
+  <p:cSld>
+    <p:spTree>
+      <p:nvGrpSpPr>
+        <p:cNvPr id="1" name=""/>
+        <p:cNvGrpSpPr/>
+        <p:nvPr/>
+      </p:nvGrpSpPr>
+      <p:grpSpPr>
+        <a:xfrm>
+          <a:off x="0" y="0"/>
+          <a:ext cx="0" cy="0"/>
+          <a:chOff x="0" y="0"/>
+          <a:chExt cx="0" cy="0"/>
+        </a:xfrm>
+      </p:grpSpPr>
+      <p:sp>
+        <p:nvSpPr>
+          <p:cNvPr id="2" name="Title 1"/>
+          <p:cNvSpPr>
+            <a:spLocks noGrp="1"/>
+          </p:cNvSpPr>
+          <p:nvPr>
+            <p:ph type="title"/>
+          </p:nvPr>
+        </p:nvSpPr>
+        <p:spPr/>
+        <p:txBody>
+          <a:bodyPr/>
+          <a:lstStyle/>
+          <a:p>
+            <a:r>
+              <a:rPr lang="en-US" dirty="0" smtClean="0"/>
+              <a:t>Mountains</a:t>
+            </a:r>
+            <a:endParaRPr lang="en-US" dirty="0"/>
+          </a:p>
+        </p:txBody>
+      </p:sp>
+      <p:sp>
+        <p:nvSpPr>
+          <p:cNvPr id="3" name="Content Placeholder 2"/>
+          <p:cNvSpPr>
+            <a:spLocks noGrp="1"/>
+          </p:cNvSpPr>
+          <p:nvPr>
+            <p:ph idx="1"/>
+          </p:nvPr>
+        </p:nvSpPr>
+        <p:spPr/>
+        <p:txBody>
+          <a:bodyPr/>
+          <a:lstStyle/>
+          <a:p>
+            <a:endParaRPr lang="en-US" dirty="0"/>
+          </a:p>
+        </p:txBody>
+      </p:sp>
+    </p:spTree>
+    <p:extLst>
+      <p:ext uri="{BB962C8B-B14F-4D97-AF65-F5344CB8AC3E}">
+        <p14:creationId xmlns:p14="http://schemas.microsoft.com/office/powerpoint/2010/main" val="78217381"/>
+      </p:ext>
+    </p:extLst>
+  </p:cSld>
+  <p:clrMapOvr>
+    <a:masterClrMapping/>
+  </p:clrMapOvr>
+  <p:timing>
+    <p:tnLst>
+      <p:par>
+        <p:cTn id="1" dur="indefinite" restart="never" nodeType="tmRoot"/>
+      </p:par>
+    </p:tnLst>
+  </p:timing>
+</p:sld>
+</file>
+
+<file path=ppt/slides/slide19.xml><?xml version="1.0" encoding="utf-8"?>
+<p:sld xmlns:a="http://schemas.openxmlformats.org/drawingml/2006/main" xmlns:r="http://schemas.openxmlformats.org/officeDocument/2006/relationships" xmlns:p="http://schemas.openxmlformats.org/presentationml/2006/main">
+  <p:cSld>
+    <p:spTree>
+      <p:nvGrpSpPr>
+        <p:cNvPr id="1" name=""/>
+        <p:cNvGrpSpPr/>
+        <p:nvPr/>
+      </p:nvGrpSpPr>
+      <p:grpSpPr>
+        <a:xfrm>
+          <a:off x="0" y="0"/>
+          <a:ext cx="0" cy="0"/>
+          <a:chOff x="0" y="0"/>
+          <a:chExt cx="0" cy="0"/>
+        </a:xfrm>
+      </p:grpSpPr>
+      <p:sp>
+        <p:nvSpPr>
+          <p:cNvPr id="2" name="Title 1"/>
+          <p:cNvSpPr>
+            <a:spLocks noGrp="1"/>
+          </p:cNvSpPr>
+          <p:nvPr>
+            <p:ph type="title"/>
+          </p:nvPr>
+        </p:nvSpPr>
+        <p:spPr/>
+        <p:txBody>
+          <a:bodyPr/>
+          <a:lstStyle/>
+          <a:p>
+            <a:r>
+              <a:rPr lang="en-US" dirty="0" smtClean="0"/>
+              <a:t>Future</a:t>
+            </a:r>
+            <a:endParaRPr lang="en-US" dirty="0"/>
+          </a:p>
+        </p:txBody>
+      </p:sp>
+      <p:sp>
+        <p:nvSpPr>
+          <p:cNvPr id="3" name="Content Placeholder 2"/>
+          <p:cNvSpPr>
+            <a:spLocks noGrp="1"/>
+          </p:cNvSpPr>
+          <p:nvPr>
+            <p:ph idx="1"/>
+          </p:nvPr>
+        </p:nvSpPr>
+        <p:spPr/>
+        <p:txBody>
+          <a:bodyPr>
+            <a:normAutofit fontScale="92500" lnSpcReduction="10000"/>
+          </a:bodyPr>
+          <a:lstStyle/>
+          <a:p>
+            <a:r>
+              <a:rPr lang="en-US" dirty="0" smtClean="0"/>
+              <a:t>Classes</a:t>
+            </a:r>
+          </a:p>
+          <a:p>
+            <a:pPr lvl="1"/>
+            <a:r>
+              <a:rPr lang="en-US" dirty="0" smtClean="0"/>
+              <a:t>Assassin</a:t>
+            </a:r>
+            <a:endParaRPr lang="en-US" dirty="0"/>
+          </a:p>
+          <a:p>
+            <a:pPr lvl="1"/>
+            <a:r>
+              <a:rPr lang="en-US" dirty="0"/>
+              <a:t>Engineer</a:t>
+            </a:r>
+          </a:p>
+          <a:p>
+            <a:pPr lvl="1"/>
+            <a:r>
+              <a:rPr lang="en-US" dirty="0"/>
+              <a:t>Mage</a:t>
+            </a:r>
+          </a:p>
+          <a:p>
+            <a:pPr lvl="1"/>
+            <a:r>
+              <a:rPr lang="en-US" dirty="0" smtClean="0"/>
+              <a:t>Knight</a:t>
+            </a:r>
+          </a:p>
+          <a:p>
+            <a:r>
+              <a:rPr lang="en-US" dirty="0" smtClean="0"/>
+              <a:t>Zones</a:t>
+            </a:r>
+            <a:endParaRPr lang="en-US" dirty="0"/>
+          </a:p>
+          <a:p>
+            <a:pPr lvl="1"/>
+            <a:r>
+              <a:rPr lang="en-US" dirty="0" smtClean="0"/>
+              <a:t>Caves</a:t>
+            </a:r>
+            <a:endParaRPr lang="en-US" dirty="0"/>
+          </a:p>
+          <a:p>
+            <a:pPr lvl="1"/>
+            <a:r>
+              <a:rPr lang="en-US" dirty="0"/>
+              <a:t>Desert</a:t>
+            </a:r>
+          </a:p>
+          <a:p>
+            <a:pPr lvl="1"/>
+            <a:r>
+              <a:rPr lang="en-US" dirty="0"/>
+              <a:t>Tropics</a:t>
+            </a:r>
+          </a:p>
+          <a:p>
+            <a:pPr lvl="1"/>
+            <a:r>
+              <a:rPr lang="en-US" dirty="0"/>
+              <a:t>Forest</a:t>
+            </a:r>
+          </a:p>
+          <a:p>
+            <a:endParaRPr lang="en-US" dirty="0"/>
+          </a:p>
+        </p:txBody>
+      </p:sp>
+    </p:spTree>
+    <p:extLst>
+      <p:ext uri="{BB962C8B-B14F-4D97-AF65-F5344CB8AC3E}">
+        <p14:creationId xmlns:p14="http://schemas.microsoft.com/office/powerpoint/2010/main" val="1591934937"/>
+      </p:ext>
+    </p:extLst>
+  </p:cSld>
+  <p:clrMapOvr>
+    <a:masterClrMapping/>
+  </p:clrMapOvr>
+  <p:timing>
+    <p:tnLst>
+      <p:par>
+        <p:cTn id="1" dur="indefinite" restart="never" nodeType="tmRoot"/>
+      </p:par>
+    </p:tnLst>
+  </p:timing>
 </p:sld>
 </file>
 
@@ -3875,6 +5178,168 @@
   <p:clrMapOvr>
     <a:masterClrMapping/>
   </p:clrMapOvr>
+  <p:timing>
+    <p:tnLst>
+      <p:par>
+        <p:cTn id="1" dur="indefinite" restart="never" nodeType="tmRoot"/>
+      </p:par>
+    </p:tnLst>
+  </p:timing>
+</p:sld>
+</file>
+
+<file path=ppt/slides/slide20.xml><?xml version="1.0" encoding="utf-8"?>
+<p:sld xmlns:a="http://schemas.openxmlformats.org/drawingml/2006/main" xmlns:r="http://schemas.openxmlformats.org/officeDocument/2006/relationships" xmlns:p="http://schemas.openxmlformats.org/presentationml/2006/main">
+  <p:cSld>
+    <p:spTree>
+      <p:nvGrpSpPr>
+        <p:cNvPr id="1" name=""/>
+        <p:cNvGrpSpPr/>
+        <p:nvPr/>
+      </p:nvGrpSpPr>
+      <p:grpSpPr>
+        <a:xfrm>
+          <a:off x="0" y="0"/>
+          <a:ext cx="0" cy="0"/>
+          <a:chOff x="0" y="0"/>
+          <a:chExt cx="0" cy="0"/>
+        </a:xfrm>
+      </p:grpSpPr>
+      <p:sp>
+        <p:nvSpPr>
+          <p:cNvPr id="2" name="Title 1"/>
+          <p:cNvSpPr>
+            <a:spLocks noGrp="1"/>
+          </p:cNvSpPr>
+          <p:nvPr>
+            <p:ph type="title"/>
+          </p:nvPr>
+        </p:nvSpPr>
+        <p:spPr/>
+        <p:txBody>
+          <a:bodyPr/>
+          <a:lstStyle/>
+          <a:p>
+            <a:r>
+              <a:rPr lang="en-US" dirty="0" smtClean="0"/>
+              <a:t>Future</a:t>
+            </a:r>
+            <a:endParaRPr lang="en-US" dirty="0"/>
+          </a:p>
+        </p:txBody>
+      </p:sp>
+      <p:sp>
+        <p:nvSpPr>
+          <p:cNvPr id="3" name="Content Placeholder 2"/>
+          <p:cNvSpPr>
+            <a:spLocks noGrp="1"/>
+          </p:cNvSpPr>
+          <p:nvPr>
+            <p:ph idx="1"/>
+          </p:nvPr>
+        </p:nvSpPr>
+        <p:spPr/>
+        <p:txBody>
+          <a:bodyPr>
+            <a:normAutofit fontScale="92500" lnSpcReduction="20000"/>
+          </a:bodyPr>
+          <a:lstStyle/>
+          <a:p>
+            <a:r>
+              <a:rPr lang="en-US" sz="3200" dirty="0" smtClean="0"/>
+              <a:t>Fast Travel</a:t>
+            </a:r>
+          </a:p>
+          <a:p>
+            <a:r>
+              <a:rPr lang="en-US" sz="3200" dirty="0" smtClean="0"/>
+              <a:t>Professions/crafting</a:t>
+            </a:r>
+            <a:endParaRPr lang="en-US" sz="2400" dirty="0"/>
+          </a:p>
+          <a:p>
+            <a:r>
+              <a:rPr lang="en-US" sz="3200" dirty="0"/>
+              <a:t>Ally inventory</a:t>
+            </a:r>
+            <a:endParaRPr lang="en-US" sz="2800" dirty="0"/>
+          </a:p>
+          <a:p>
+            <a:r>
+              <a:rPr lang="en-US" sz="3200" dirty="0"/>
+              <a:t>Persistent poison damage after battles</a:t>
+            </a:r>
+            <a:endParaRPr lang="en-US" sz="2800" dirty="0"/>
+          </a:p>
+          <a:p>
+            <a:r>
+              <a:rPr lang="en-US" sz="3200" dirty="0" smtClean="0"/>
+              <a:t>Micro-transactions</a:t>
+            </a:r>
+          </a:p>
+          <a:p>
+            <a:pPr lvl="1"/>
+            <a:r>
+              <a:rPr lang="en-US" sz="2800" dirty="0"/>
+              <a:t>Currency</a:t>
+            </a:r>
+            <a:endParaRPr lang="en-US" sz="2400" dirty="0"/>
+          </a:p>
+          <a:p>
+            <a:pPr lvl="2"/>
+            <a:r>
+              <a:rPr lang="en-US" dirty="0"/>
+              <a:t>Diamonds</a:t>
+            </a:r>
+            <a:endParaRPr lang="en-US" sz="2000" dirty="0"/>
+          </a:p>
+          <a:p>
+            <a:pPr lvl="1"/>
+            <a:r>
+              <a:rPr lang="en-US" sz="2800" dirty="0"/>
+              <a:t>Allows instant access to content</a:t>
+            </a:r>
+            <a:endParaRPr lang="en-US" sz="2400" dirty="0"/>
+          </a:p>
+          <a:p>
+            <a:pPr lvl="1"/>
+            <a:r>
+              <a:rPr lang="en-US" sz="2800" dirty="0"/>
+              <a:t>Bundles</a:t>
+            </a:r>
+            <a:endParaRPr lang="en-US" sz="2400" dirty="0"/>
+          </a:p>
+          <a:p>
+            <a:pPr lvl="1"/>
+            <a:r>
+              <a:rPr lang="en-US" sz="2800" dirty="0"/>
+              <a:t>Remove </a:t>
+            </a:r>
+            <a:r>
+              <a:rPr lang="en-US" sz="2800" dirty="0" smtClean="0"/>
+              <a:t>ads</a:t>
+            </a:r>
+            <a:endParaRPr lang="en-US" sz="2400" dirty="0"/>
+          </a:p>
+        </p:txBody>
+      </p:sp>
+    </p:spTree>
+    <p:extLst>
+      <p:ext uri="{BB962C8B-B14F-4D97-AF65-F5344CB8AC3E}">
+        <p14:creationId xmlns:p14="http://schemas.microsoft.com/office/powerpoint/2010/main" val="3042695222"/>
+      </p:ext>
+    </p:extLst>
+  </p:cSld>
+  <p:clrMapOvr>
+    <a:masterClrMapping/>
+  </p:clrMapOvr>
+  <p:timing>
+    <p:tnLst>
+      <p:par>
+        <p:cTn id="1" dur="indefinite" restart="never" nodeType="tmRoot"/>
+      </p:par>
+    </p:tnLst>
+  </p:timing>
 </p:sld>
 </file>
 
@@ -3912,7 +5377,7 @@
           <a:p>
             <a:r>
               <a:rPr lang="en-US" dirty="0" smtClean="0"/>
-              <a:t>Classes</a:t>
+              <a:t>Development Environment</a:t>
             </a:r>
             <a:endParaRPr lang="en-US" dirty="0"/>
           </a:p>
@@ -3931,85 +5396,96 @@
         <p:spPr/>
         <p:txBody>
           <a:bodyPr>
-            <a:normAutofit/>
+            <a:normAutofit fontScale="92500" lnSpcReduction="10000"/>
           </a:bodyPr>
           <a:lstStyle/>
           <a:p>
             <a:r>
               <a:rPr lang="en-US" dirty="0" smtClean="0"/>
-              <a:t>Planned</a:t>
-            </a:r>
-          </a:p>
-          <a:p>
-            <a:pPr lvl="1"/>
-            <a:r>
-              <a:rPr lang="en-US" dirty="0" smtClean="0"/>
-              <a:t>Warrior</a:t>
-            </a:r>
-          </a:p>
-          <a:p>
-            <a:pPr lvl="1"/>
-            <a:r>
-              <a:rPr lang="en-US" dirty="0" smtClean="0"/>
-              <a:t>Cleric</a:t>
-            </a:r>
-          </a:p>
-          <a:p>
-            <a:pPr lvl="1"/>
-            <a:r>
-              <a:rPr lang="en-US" dirty="0" smtClean="0"/>
-              <a:t>Ranger</a:t>
-            </a:r>
-          </a:p>
-          <a:p>
-            <a:r>
-              <a:rPr lang="en-US" dirty="0" smtClean="0"/>
-              <a:t>Future</a:t>
-            </a:r>
-          </a:p>
-          <a:p>
-            <a:pPr lvl="1"/>
-            <a:r>
-              <a:rPr lang="en-US" dirty="0" smtClean="0"/>
-              <a:t>Assassin</a:t>
-            </a:r>
-          </a:p>
-          <a:p>
-            <a:pPr lvl="1"/>
-            <a:r>
-              <a:rPr lang="en-US" dirty="0" smtClean="0"/>
-              <a:t>Engineer</a:t>
-            </a:r>
-          </a:p>
-          <a:p>
-            <a:pPr lvl="1"/>
-            <a:r>
-              <a:rPr lang="en-US" dirty="0" smtClean="0"/>
-              <a:t>Mage</a:t>
-            </a:r>
-          </a:p>
-          <a:p>
-            <a:pPr lvl="1"/>
-            <a:r>
-              <a:rPr lang="en-US" dirty="0" smtClean="0"/>
-              <a:t>Knight</a:t>
-            </a:r>
-          </a:p>
-          <a:p>
-            <a:endParaRPr lang="en-US" dirty="0"/>
+              <a:t>Android SDK</a:t>
+            </a:r>
+          </a:p>
+          <a:p>
+            <a:pPr lvl="1"/>
+            <a:r>
+              <a:rPr lang="en-US" dirty="0" smtClean="0"/>
+              <a:t>Java</a:t>
+            </a:r>
+          </a:p>
+          <a:p>
+            <a:pPr lvl="1"/>
+            <a:r>
+              <a:rPr lang="en-US" dirty="0" smtClean="0"/>
+              <a:t>Eclipse</a:t>
+            </a:r>
+          </a:p>
+          <a:p>
+            <a:r>
+              <a:rPr lang="en-US" dirty="0" smtClean="0"/>
+              <a:t>Tiled</a:t>
+            </a:r>
+          </a:p>
+          <a:p>
+            <a:pPr lvl="1"/>
+            <a:r>
+              <a:rPr lang="en-US" dirty="0" smtClean="0"/>
+              <a:t>Tile Engine</a:t>
+            </a:r>
+          </a:p>
+          <a:p>
+            <a:r>
+              <a:rPr lang="en-US" dirty="0" err="1" smtClean="0"/>
+              <a:t>TexturePacker</a:t>
+            </a:r>
+            <a:endParaRPr lang="en-US" dirty="0" smtClean="0"/>
+          </a:p>
+          <a:p>
+            <a:pPr lvl="1"/>
+            <a:r>
+              <a:rPr lang="en-US" dirty="0" smtClean="0"/>
+              <a:t>Creates Sprite Sheets</a:t>
+            </a:r>
+          </a:p>
+          <a:p>
+            <a:r>
+              <a:rPr lang="en-US" dirty="0" err="1" smtClean="0"/>
+              <a:t>GitHub</a:t>
+            </a:r>
+            <a:endParaRPr lang="en-US" dirty="0" smtClean="0"/>
+          </a:p>
+          <a:p>
+            <a:pPr lvl="1"/>
+            <a:r>
+              <a:rPr lang="en-US" dirty="0" smtClean="0"/>
+              <a:t>Version Control</a:t>
+            </a:r>
+          </a:p>
+          <a:p>
+            <a:pPr lvl="1"/>
+            <a:r>
+              <a:rPr lang="en-US" dirty="0" smtClean="0"/>
+              <a:t>Online Repository</a:t>
+            </a:r>
           </a:p>
         </p:txBody>
       </p:sp>
     </p:spTree>
     <p:extLst>
       <p:ext uri="{BB962C8B-B14F-4D97-AF65-F5344CB8AC3E}">
-        <p14:creationId xmlns:p14="http://schemas.microsoft.com/office/powerpoint/2010/main" val="601752405"/>
+        <p14:creationId xmlns:p14="http://schemas.microsoft.com/office/powerpoint/2010/main" val="2678322270"/>
       </p:ext>
     </p:extLst>
   </p:cSld>
   <p:clrMapOvr>
     <a:masterClrMapping/>
   </p:clrMapOvr>
+  <p:timing>
+    <p:tnLst>
+      <p:par>
+        <p:cTn id="1" dur="indefinite" restart="never" nodeType="tmRoot"/>
+      </p:par>
+    </p:tnLst>
+  </p:timing>
 </p:sld>
 </file>
 
@@ -4047,7 +5523,7 @@
           <a:p>
             <a:r>
               <a:rPr lang="en-US" dirty="0" smtClean="0"/>
-              <a:t>Zones</a:t>
+              <a:t>Game Summary</a:t>
             </a:r>
             <a:endParaRPr lang="en-US" dirty="0"/>
           </a:p>
@@ -4066,82 +5542,61 @@
         <p:spPr/>
         <p:txBody>
           <a:bodyPr>
-            <a:normAutofit/>
+            <a:normAutofit fontScale="92500" lnSpcReduction="20000"/>
           </a:bodyPr>
           <a:lstStyle/>
           <a:p>
             <a:r>
-              <a:rPr lang="en-US" dirty="0" smtClean="0"/>
-              <a:t>Planned</a:t>
-            </a:r>
-          </a:p>
-          <a:p>
-            <a:pPr lvl="1"/>
-            <a:r>
-              <a:rPr lang="en-US" dirty="0" smtClean="0"/>
-              <a:t>Starter Village</a:t>
-            </a:r>
-          </a:p>
-          <a:p>
-            <a:pPr lvl="1"/>
-            <a:r>
-              <a:rPr lang="en-US" dirty="0" smtClean="0"/>
-              <a:t>Plains</a:t>
-            </a:r>
-          </a:p>
-          <a:p>
-            <a:pPr lvl="1"/>
-            <a:r>
-              <a:rPr lang="en-US" dirty="0" smtClean="0"/>
-              <a:t>Mountains</a:t>
-            </a:r>
-          </a:p>
-          <a:p>
-            <a:r>
-              <a:rPr lang="en-US" dirty="0" smtClean="0"/>
-              <a:t>Future</a:t>
-            </a:r>
-          </a:p>
-          <a:p>
-            <a:pPr lvl="1"/>
-            <a:r>
-              <a:rPr lang="en-US" dirty="0" smtClean="0"/>
-              <a:t>Caves</a:t>
-            </a:r>
-          </a:p>
-          <a:p>
-            <a:pPr lvl="1"/>
-            <a:r>
-              <a:rPr lang="en-US" dirty="0" smtClean="0"/>
-              <a:t>Desert</a:t>
-            </a:r>
-          </a:p>
-          <a:p>
-            <a:pPr lvl="1"/>
-            <a:r>
-              <a:rPr lang="en-US" dirty="0" smtClean="0"/>
-              <a:t>Tropics</a:t>
-            </a:r>
-          </a:p>
-          <a:p>
-            <a:pPr lvl="1"/>
-            <a:r>
-              <a:rPr lang="en-US" dirty="0" smtClean="0"/>
-              <a:t>Forest</a:t>
-            </a:r>
+              <a:rPr lang="en-US" sz="3200" dirty="0"/>
+              <a:t>Backstory</a:t>
+            </a:r>
+            <a:endParaRPr lang="en-US" sz="2800" dirty="0"/>
+          </a:p>
+          <a:p>
+            <a:pPr lvl="1"/>
+            <a:r>
+              <a:rPr lang="en-US" dirty="0"/>
+              <a:t>The world is unaware of the presence of dragons within their peaceful societies. Until that fateful day when dragons awakened, the world was never the same.</a:t>
+            </a:r>
+            <a:endParaRPr lang="en-US" sz="2200" dirty="0"/>
+          </a:p>
+          <a:p>
+            <a:r>
+              <a:rPr lang="en-US" sz="3200" dirty="0"/>
+              <a:t>Story</a:t>
+            </a:r>
+            <a:endParaRPr lang="en-US" sz="2800" dirty="0"/>
+          </a:p>
+          <a:p>
+            <a:pPr lvl="1"/>
+            <a:r>
+              <a:rPr lang="en-US" dirty="0"/>
+              <a:t>Dragons have awakened in each of the regions and the local hostile tribes now worship them as Gods. It is the duty of the player to defeat the dragons in each of the regions, shattering the hostile tribes that worship them in the process. This eventually leads to defeating the Elder Dragon to rid the world of dragons forever.</a:t>
+            </a:r>
+            <a:endParaRPr lang="en-US" sz="2200" dirty="0"/>
+          </a:p>
+          <a:p>
+            <a:endParaRPr lang="en-US" dirty="0"/>
           </a:p>
         </p:txBody>
       </p:sp>
     </p:spTree>
     <p:extLst>
       <p:ext uri="{BB962C8B-B14F-4D97-AF65-F5344CB8AC3E}">
-        <p14:creationId xmlns:p14="http://schemas.microsoft.com/office/powerpoint/2010/main" val="457825509"/>
+        <p14:creationId xmlns:p14="http://schemas.microsoft.com/office/powerpoint/2010/main" val="238155519"/>
       </p:ext>
     </p:extLst>
   </p:cSld>
   <p:clrMapOvr>
     <a:masterClrMapping/>
   </p:clrMapOvr>
+  <p:timing>
+    <p:tnLst>
+      <p:par>
+        <p:cTn id="1" dur="indefinite" restart="never" nodeType="tmRoot"/>
+      </p:par>
+    </p:tnLst>
+  </p:timing>
 </p:sld>
 </file>
 
@@ -4179,7 +5634,7 @@
           <a:p>
             <a:r>
               <a:rPr lang="en-US" dirty="0" smtClean="0"/>
-              <a:t>Learning Curve</a:t>
+              <a:t>Classes</a:t>
             </a:r>
             <a:endParaRPr lang="en-US" dirty="0"/>
           </a:p>
@@ -4197,47 +5652,579 @@
         </p:nvSpPr>
         <p:spPr/>
         <p:txBody>
-          <a:bodyPr/>
-          <a:lstStyle/>
-          <a:p>
-            <a:r>
-              <a:rPr lang="en-US" dirty="0" smtClean="0"/>
-              <a:t>AndEngine</a:t>
-            </a:r>
-          </a:p>
-          <a:p>
-            <a:pPr lvl="1"/>
-            <a:r>
-              <a:rPr lang="en-US" dirty="0" smtClean="0"/>
-              <a:t>Open source</a:t>
-            </a:r>
-          </a:p>
-          <a:p>
-            <a:pPr lvl="1"/>
-            <a:r>
-              <a:rPr lang="en-US" dirty="0" smtClean="0"/>
-              <a:t>Framework</a:t>
-            </a:r>
+          <a:bodyPr>
+            <a:normAutofit/>
+          </a:bodyPr>
+          <a:lstStyle/>
+          <a:p>
+            <a:r>
+              <a:rPr lang="en-US" dirty="0" smtClean="0"/>
+              <a:t>Warrior</a:t>
+            </a:r>
+            <a:endParaRPr lang="en-US" dirty="0" smtClean="0"/>
+          </a:p>
+          <a:p>
+            <a:endParaRPr lang="en-US" dirty="0" smtClean="0"/>
+          </a:p>
+          <a:p>
+            <a:r>
+              <a:rPr lang="en-US" dirty="0" smtClean="0"/>
+              <a:t>Cleric</a:t>
+            </a:r>
+            <a:endParaRPr lang="en-US" dirty="0" smtClean="0"/>
+          </a:p>
+          <a:p>
+            <a:endParaRPr lang="en-US" dirty="0" smtClean="0"/>
+          </a:p>
+          <a:p>
+            <a:r>
+              <a:rPr lang="en-US" dirty="0" smtClean="0"/>
+              <a:t>Ranger</a:t>
+            </a:r>
+            <a:endParaRPr lang="en-US" dirty="0" smtClean="0"/>
+          </a:p>
+          <a:p>
             <a:endParaRPr lang="en-US" dirty="0"/>
-          </a:p>
-          <a:p>
-            <a:r>
-              <a:rPr lang="en-US" dirty="0" smtClean="0"/>
-              <a:t>Java</a:t>
-            </a:r>
           </a:p>
         </p:txBody>
       </p:sp>
     </p:spTree>
     <p:extLst>
       <p:ext uri="{BB962C8B-B14F-4D97-AF65-F5344CB8AC3E}">
-        <p14:creationId xmlns:p14="http://schemas.microsoft.com/office/powerpoint/2010/main" val="965814597"/>
+        <p14:creationId xmlns:p14="http://schemas.microsoft.com/office/powerpoint/2010/main" val="601752405"/>
       </p:ext>
     </p:extLst>
   </p:cSld>
   <p:clrMapOvr>
     <a:masterClrMapping/>
   </p:clrMapOvr>
+  <p:timing>
+    <p:tnLst>
+      <p:par>
+        <p:cTn id="1" dur="indefinite" restart="never" nodeType="tmRoot"/>
+      </p:par>
+    </p:tnLst>
+  </p:timing>
+</p:sld>
+</file>
+
+<file path=ppt/slides/slide6.xml><?xml version="1.0" encoding="utf-8"?>
+<p:sld xmlns:a="http://schemas.openxmlformats.org/drawingml/2006/main" xmlns:r="http://schemas.openxmlformats.org/officeDocument/2006/relationships" xmlns:p="http://schemas.openxmlformats.org/presentationml/2006/main">
+  <p:cSld>
+    <p:spTree>
+      <p:nvGrpSpPr>
+        <p:cNvPr id="1" name=""/>
+        <p:cNvGrpSpPr/>
+        <p:nvPr/>
+      </p:nvGrpSpPr>
+      <p:grpSpPr>
+        <a:xfrm>
+          <a:off x="0" y="0"/>
+          <a:ext cx="0" cy="0"/>
+          <a:chOff x="0" y="0"/>
+          <a:chExt cx="0" cy="0"/>
+        </a:xfrm>
+      </p:grpSpPr>
+      <p:sp>
+        <p:nvSpPr>
+          <p:cNvPr id="2" name="Title 1"/>
+          <p:cNvSpPr>
+            <a:spLocks noGrp="1"/>
+          </p:cNvSpPr>
+          <p:nvPr>
+            <p:ph type="title"/>
+          </p:nvPr>
+        </p:nvSpPr>
+        <p:spPr/>
+        <p:txBody>
+          <a:bodyPr/>
+          <a:lstStyle/>
+          <a:p>
+            <a:r>
+              <a:rPr lang="en-US" dirty="0" smtClean="0"/>
+              <a:t>Warrior Description</a:t>
+            </a:r>
+            <a:endParaRPr lang="en-US" dirty="0"/>
+          </a:p>
+        </p:txBody>
+      </p:sp>
+      <p:sp>
+        <p:nvSpPr>
+          <p:cNvPr id="3" name="Content Placeholder 2"/>
+          <p:cNvSpPr>
+            <a:spLocks noGrp="1"/>
+          </p:cNvSpPr>
+          <p:nvPr>
+            <p:ph idx="1"/>
+          </p:nvPr>
+        </p:nvSpPr>
+        <p:spPr/>
+        <p:txBody>
+          <a:bodyPr/>
+          <a:lstStyle/>
+          <a:p>
+            <a:endParaRPr lang="en-US" dirty="0" smtClean="0"/>
+          </a:p>
+          <a:p>
+            <a:r>
+              <a:rPr lang="en-US" dirty="0" smtClean="0"/>
+              <a:t>Master </a:t>
+            </a:r>
+            <a:r>
+              <a:rPr lang="en-US" dirty="0"/>
+              <a:t>of brute force melee combat, capable of frightening the foe with appearance alone. Prefers the simple lifestyle of slaughtering many and enjoying a tall glass of mead on the side.</a:t>
+            </a:r>
+            <a:endParaRPr lang="en-US" dirty="0"/>
+          </a:p>
+        </p:txBody>
+      </p:sp>
+    </p:spTree>
+    <p:extLst>
+      <p:ext uri="{BB962C8B-B14F-4D97-AF65-F5344CB8AC3E}">
+        <p14:creationId xmlns:p14="http://schemas.microsoft.com/office/powerpoint/2010/main" val="1904278846"/>
+      </p:ext>
+    </p:extLst>
+  </p:cSld>
+  <p:clrMapOvr>
+    <a:masterClrMapping/>
+  </p:clrMapOvr>
+  <p:timing>
+    <p:tnLst>
+      <p:par>
+        <p:cTn id="1" dur="indefinite" restart="never" nodeType="tmRoot"/>
+      </p:par>
+    </p:tnLst>
+  </p:timing>
+</p:sld>
+</file>
+
+<file path=ppt/slides/slide7.xml><?xml version="1.0" encoding="utf-8"?>
+<p:sld xmlns:a="http://schemas.openxmlformats.org/drawingml/2006/main" xmlns:r="http://schemas.openxmlformats.org/officeDocument/2006/relationships" xmlns:p="http://schemas.openxmlformats.org/presentationml/2006/main">
+  <p:cSld>
+    <p:spTree>
+      <p:nvGrpSpPr>
+        <p:cNvPr id="1" name=""/>
+        <p:cNvGrpSpPr/>
+        <p:nvPr/>
+      </p:nvGrpSpPr>
+      <p:grpSpPr>
+        <a:xfrm>
+          <a:off x="0" y="0"/>
+          <a:ext cx="0" cy="0"/>
+          <a:chOff x="0" y="0"/>
+          <a:chExt cx="0" cy="0"/>
+        </a:xfrm>
+      </p:grpSpPr>
+      <p:sp>
+        <p:nvSpPr>
+          <p:cNvPr id="2" name="Title 1"/>
+          <p:cNvSpPr>
+            <a:spLocks noGrp="1"/>
+          </p:cNvSpPr>
+          <p:nvPr>
+            <p:ph type="title"/>
+          </p:nvPr>
+        </p:nvSpPr>
+        <p:spPr/>
+        <p:txBody>
+          <a:bodyPr/>
+          <a:lstStyle/>
+          <a:p>
+            <a:r>
+              <a:rPr lang="en-US" dirty="0" smtClean="0"/>
+              <a:t>Warrior Abilities</a:t>
+            </a:r>
+            <a:endParaRPr lang="en-US" dirty="0"/>
+          </a:p>
+        </p:txBody>
+      </p:sp>
+      <p:sp>
+        <p:nvSpPr>
+          <p:cNvPr id="3" name="Content Placeholder 2"/>
+          <p:cNvSpPr>
+            <a:spLocks noGrp="1"/>
+          </p:cNvSpPr>
+          <p:nvPr>
+            <p:ph idx="1"/>
+          </p:nvPr>
+        </p:nvSpPr>
+        <p:spPr/>
+        <p:txBody>
+          <a:bodyPr>
+            <a:normAutofit fontScale="62500" lnSpcReduction="20000"/>
+          </a:bodyPr>
+          <a:lstStyle/>
+          <a:p>
+            <a:r>
+              <a:rPr lang="en-US" dirty="0"/>
+              <a:t>Basic Attack</a:t>
+            </a:r>
+          </a:p>
+          <a:p>
+            <a:pPr lvl="1"/>
+            <a:r>
+              <a:rPr lang="en-US" dirty="0"/>
+              <a:t>No resource</a:t>
+            </a:r>
+          </a:p>
+          <a:p>
+            <a:r>
+              <a:rPr lang="en-US" dirty="0"/>
+              <a:t>Cleave</a:t>
+            </a:r>
+          </a:p>
+          <a:p>
+            <a:pPr lvl="1"/>
+            <a:r>
+              <a:rPr lang="en-US" dirty="0"/>
+              <a:t>Attacks all enemies</a:t>
+            </a:r>
+          </a:p>
+          <a:p>
+            <a:pPr lvl="1"/>
+            <a:r>
+              <a:rPr lang="en-US" dirty="0"/>
+              <a:t>75% base damage</a:t>
+            </a:r>
+          </a:p>
+          <a:p>
+            <a:r>
+              <a:rPr lang="en-US" dirty="0"/>
+              <a:t>Lunge</a:t>
+            </a:r>
+          </a:p>
+          <a:p>
+            <a:pPr lvl="1"/>
+            <a:r>
+              <a:rPr lang="en-US" dirty="0"/>
+              <a:t>Single target</a:t>
+            </a:r>
+          </a:p>
+          <a:p>
+            <a:pPr lvl="1"/>
+            <a:r>
+              <a:rPr lang="en-US" dirty="0"/>
+              <a:t>Chance to stun</a:t>
+            </a:r>
+          </a:p>
+          <a:p>
+            <a:r>
+              <a:rPr lang="en-US" dirty="0"/>
+              <a:t>Execute</a:t>
+            </a:r>
+          </a:p>
+          <a:p>
+            <a:pPr lvl="1"/>
+            <a:r>
+              <a:rPr lang="en-US" dirty="0"/>
+              <a:t>Full depletion of resource</a:t>
+            </a:r>
+          </a:p>
+          <a:p>
+            <a:pPr lvl="1"/>
+            <a:r>
+              <a:rPr lang="en-US" dirty="0"/>
+              <a:t>Damage based on resource depletion</a:t>
+            </a:r>
+          </a:p>
+          <a:p>
+            <a:r>
+              <a:rPr lang="en-US" dirty="0"/>
+              <a:t>Rend </a:t>
+            </a:r>
+          </a:p>
+          <a:p>
+            <a:pPr lvl="1"/>
+            <a:r>
+              <a:rPr lang="en-US" dirty="0"/>
+              <a:t>No initial damage</a:t>
+            </a:r>
+          </a:p>
+          <a:p>
+            <a:pPr lvl="1"/>
+            <a:r>
+              <a:rPr lang="en-US" dirty="0"/>
+              <a:t>Chance to bleed</a:t>
+            </a:r>
+          </a:p>
+          <a:p>
+            <a:r>
+              <a:rPr lang="en-US" dirty="0"/>
+              <a:t>War Cry</a:t>
+            </a:r>
+          </a:p>
+          <a:p>
+            <a:pPr lvl="1"/>
+            <a:r>
+              <a:rPr lang="en-US" dirty="0"/>
+              <a:t>Increases party damage</a:t>
+            </a:r>
+          </a:p>
+          <a:p>
+            <a:pPr lvl="1"/>
+            <a:r>
+              <a:rPr lang="en-US" dirty="0"/>
+              <a:t>Costs half of total stamina</a:t>
+            </a:r>
+          </a:p>
+          <a:p>
+            <a:endParaRPr lang="en-US" dirty="0"/>
+          </a:p>
+        </p:txBody>
+      </p:sp>
+    </p:spTree>
+    <p:extLst>
+      <p:ext uri="{BB962C8B-B14F-4D97-AF65-F5344CB8AC3E}">
+        <p14:creationId xmlns:p14="http://schemas.microsoft.com/office/powerpoint/2010/main" val="2080000123"/>
+      </p:ext>
+    </p:extLst>
+  </p:cSld>
+  <p:clrMapOvr>
+    <a:masterClrMapping/>
+  </p:clrMapOvr>
+  <p:timing>
+    <p:tnLst>
+      <p:par>
+        <p:cTn id="1" dur="indefinite" restart="never" nodeType="tmRoot"/>
+      </p:par>
+    </p:tnLst>
+  </p:timing>
+</p:sld>
+</file>
+
+<file path=ppt/slides/slide8.xml><?xml version="1.0" encoding="utf-8"?>
+<p:sld xmlns:a="http://schemas.openxmlformats.org/drawingml/2006/main" xmlns:r="http://schemas.openxmlformats.org/officeDocument/2006/relationships" xmlns:p="http://schemas.openxmlformats.org/presentationml/2006/main">
+  <p:cSld>
+    <p:spTree>
+      <p:nvGrpSpPr>
+        <p:cNvPr id="1" name=""/>
+        <p:cNvGrpSpPr/>
+        <p:nvPr/>
+      </p:nvGrpSpPr>
+      <p:grpSpPr>
+        <a:xfrm>
+          <a:off x="0" y="0"/>
+          <a:ext cx="0" cy="0"/>
+          <a:chOff x="0" y="0"/>
+          <a:chExt cx="0" cy="0"/>
+        </a:xfrm>
+      </p:grpSpPr>
+      <p:sp>
+        <p:nvSpPr>
+          <p:cNvPr id="2" name="Title 1"/>
+          <p:cNvSpPr>
+            <a:spLocks noGrp="1"/>
+          </p:cNvSpPr>
+          <p:nvPr>
+            <p:ph type="title"/>
+          </p:nvPr>
+        </p:nvSpPr>
+        <p:spPr/>
+        <p:txBody>
+          <a:bodyPr/>
+          <a:lstStyle/>
+          <a:p>
+            <a:r>
+              <a:rPr lang="en-US" dirty="0" smtClean="0"/>
+              <a:t>Warrior Gear</a:t>
+            </a:r>
+            <a:endParaRPr lang="en-US" dirty="0"/>
+          </a:p>
+        </p:txBody>
+      </p:sp>
+      <p:sp>
+        <p:nvSpPr>
+          <p:cNvPr id="3" name="Content Placeholder 2"/>
+          <p:cNvSpPr>
+            <a:spLocks noGrp="1"/>
+          </p:cNvSpPr>
+          <p:nvPr>
+            <p:ph idx="1"/>
+          </p:nvPr>
+        </p:nvSpPr>
+        <p:spPr/>
+        <p:txBody>
+          <a:bodyPr>
+            <a:normAutofit/>
+          </a:bodyPr>
+          <a:lstStyle/>
+          <a:p>
+            <a:r>
+              <a:rPr lang="en-US" dirty="0" smtClean="0"/>
+              <a:t>Armor</a:t>
+            </a:r>
+          </a:p>
+          <a:p>
+            <a:pPr lvl="1"/>
+            <a:r>
+              <a:rPr lang="en-US" dirty="0" smtClean="0"/>
+              <a:t>Heavy</a:t>
+            </a:r>
+          </a:p>
+          <a:p>
+            <a:r>
+              <a:rPr lang="en-US" dirty="0" smtClean="0"/>
+              <a:t>Weapons</a:t>
+            </a:r>
+          </a:p>
+          <a:p>
+            <a:pPr lvl="1"/>
+            <a:r>
+              <a:rPr lang="en-US" dirty="0"/>
+              <a:t>One-handed swords</a:t>
+            </a:r>
+          </a:p>
+          <a:p>
+            <a:pPr lvl="1"/>
+            <a:r>
+              <a:rPr lang="en-US" dirty="0"/>
+              <a:t>One-handed axes</a:t>
+            </a:r>
+          </a:p>
+          <a:p>
+            <a:pPr lvl="1"/>
+            <a:r>
+              <a:rPr lang="en-US" dirty="0"/>
+              <a:t>One-handed maces</a:t>
+            </a:r>
+          </a:p>
+          <a:p>
+            <a:pPr lvl="1"/>
+            <a:r>
+              <a:rPr lang="en-US" dirty="0"/>
+              <a:t>Two-handed swords</a:t>
+            </a:r>
+          </a:p>
+          <a:p>
+            <a:pPr lvl="1"/>
+            <a:r>
+              <a:rPr lang="en-US" dirty="0"/>
+              <a:t>Two-handed axes</a:t>
+            </a:r>
+          </a:p>
+          <a:p>
+            <a:pPr lvl="1"/>
+            <a:r>
+              <a:rPr lang="en-US" dirty="0"/>
+              <a:t>Two-handed maces</a:t>
+            </a:r>
+          </a:p>
+          <a:p>
+            <a:endParaRPr lang="en-US" dirty="0" smtClean="0"/>
+          </a:p>
+          <a:p>
+            <a:pPr lvl="1"/>
+            <a:endParaRPr lang="en-US" dirty="0"/>
+          </a:p>
+          <a:p>
+            <a:pPr lvl="1"/>
+            <a:endParaRPr lang="en-US" dirty="0"/>
+          </a:p>
+        </p:txBody>
+      </p:sp>
+    </p:spTree>
+    <p:extLst>
+      <p:ext uri="{BB962C8B-B14F-4D97-AF65-F5344CB8AC3E}">
+        <p14:creationId xmlns:p14="http://schemas.microsoft.com/office/powerpoint/2010/main" val="1685349913"/>
+      </p:ext>
+    </p:extLst>
+  </p:cSld>
+  <p:clrMapOvr>
+    <a:masterClrMapping/>
+  </p:clrMapOvr>
+  <p:timing>
+    <p:tnLst>
+      <p:par>
+        <p:cTn id="1" dur="indefinite" restart="never" nodeType="tmRoot"/>
+      </p:par>
+    </p:tnLst>
+  </p:timing>
+</p:sld>
+</file>
+
+<file path=ppt/slides/slide9.xml><?xml version="1.0" encoding="utf-8"?>
+<p:sld xmlns:a="http://schemas.openxmlformats.org/drawingml/2006/main" xmlns:r="http://schemas.openxmlformats.org/officeDocument/2006/relationships" xmlns:p="http://schemas.openxmlformats.org/presentationml/2006/main">
+  <p:cSld>
+    <p:spTree>
+      <p:nvGrpSpPr>
+        <p:cNvPr id="1" name=""/>
+        <p:cNvGrpSpPr/>
+        <p:nvPr/>
+      </p:nvGrpSpPr>
+      <p:grpSpPr>
+        <a:xfrm>
+          <a:off x="0" y="0"/>
+          <a:ext cx="0" cy="0"/>
+          <a:chOff x="0" y="0"/>
+          <a:chExt cx="0" cy="0"/>
+        </a:xfrm>
+      </p:grpSpPr>
+      <p:sp>
+        <p:nvSpPr>
+          <p:cNvPr id="2" name="Title 1"/>
+          <p:cNvSpPr>
+            <a:spLocks noGrp="1"/>
+          </p:cNvSpPr>
+          <p:nvPr>
+            <p:ph type="title"/>
+          </p:nvPr>
+        </p:nvSpPr>
+        <p:spPr/>
+        <p:txBody>
+          <a:bodyPr/>
+          <a:lstStyle/>
+          <a:p>
+            <a:r>
+              <a:rPr lang="en-US" dirty="0" smtClean="0"/>
+              <a:t>Cleric Description</a:t>
+            </a:r>
+            <a:endParaRPr lang="en-US" dirty="0"/>
+          </a:p>
+        </p:txBody>
+      </p:sp>
+      <p:sp>
+        <p:nvSpPr>
+          <p:cNvPr id="3" name="Content Placeholder 2"/>
+          <p:cNvSpPr>
+            <a:spLocks noGrp="1"/>
+          </p:cNvSpPr>
+          <p:nvPr>
+            <p:ph idx="1"/>
+          </p:nvPr>
+        </p:nvSpPr>
+        <p:spPr/>
+        <p:txBody>
+          <a:bodyPr/>
+          <a:lstStyle/>
+          <a:p>
+            <a:endParaRPr lang="en-US" dirty="0" smtClean="0"/>
+          </a:p>
+          <a:p>
+            <a:r>
+              <a:rPr lang="en-US" sz="3200" dirty="0"/>
+              <a:t>Master of the healing magics, capable of giving the wounded another chance at life. Spends his free time in meditation and prayer in churches and clinics.</a:t>
+            </a:r>
+            <a:endParaRPr lang="en-US" sz="2800" dirty="0"/>
+          </a:p>
+        </p:txBody>
+      </p:sp>
+    </p:spTree>
+    <p:extLst>
+      <p:ext uri="{BB962C8B-B14F-4D97-AF65-F5344CB8AC3E}">
+        <p14:creationId xmlns:p14="http://schemas.microsoft.com/office/powerpoint/2010/main" val="943899759"/>
+      </p:ext>
+    </p:extLst>
+  </p:cSld>
+  <p:clrMapOvr>
+    <a:masterClrMapping/>
+  </p:clrMapOvr>
+  <p:timing>
+    <p:tnLst>
+      <p:par>
+        <p:cTn id="1" dur="indefinite" restart="never" nodeType="tmRoot"/>
+      </p:par>
+    </p:tnLst>
+  </p:timing>
 </p:sld>
 </file>
 

</xml_diff>